<commit_message>
Varios archivos y clase String
</commit_message>
<xml_diff>
--- a/Slides/7_Ciclos_Archivos.pptx
+++ b/Slides/7_Ciclos_Archivos.pptx
@@ -155,7 +155,7 @@
   <pc:docChgLst>
     <pc:chgData name="Cesar Augusto Lopez Gallego" userId="0dfa9112-9251-4882-b472-cf2dfcee09d1" providerId="ADAL" clId="{EF67AD0F-41E1-4758-B38C-C728DCC8A591}"/>
     <pc:docChg chg="custSel addSld delSld modSld">
-      <pc:chgData name="Cesar Augusto Lopez Gallego" userId="0dfa9112-9251-4882-b472-cf2dfcee09d1" providerId="ADAL" clId="{EF67AD0F-41E1-4758-B38C-C728DCC8A591}" dt="2024-08-30T12:14:48.820" v="101" actId="20577"/>
+      <pc:chgData name="Cesar Augusto Lopez Gallego" userId="0dfa9112-9251-4882-b472-cf2dfcee09d1" providerId="ADAL" clId="{EF67AD0F-41E1-4758-B38C-C728DCC8A591}" dt="2024-09-10T14:18:03.224" v="230" actId="207"/>
       <pc:docMkLst>
         <pc:docMk/>
       </pc:docMkLst>
@@ -197,6 +197,21 @@
           </ac:spMkLst>
         </pc:spChg>
       </pc:sldChg>
+      <pc:sldChg chg="modSp mod">
+        <pc:chgData name="Cesar Augusto Lopez Gallego" userId="0dfa9112-9251-4882-b472-cf2dfcee09d1" providerId="ADAL" clId="{EF67AD0F-41E1-4758-B38C-C728DCC8A591}" dt="2024-09-10T14:18:03.224" v="230" actId="207"/>
+        <pc:sldMkLst>
+          <pc:docMk/>
+          <pc:sldMk cId="168026166" sldId="349"/>
+        </pc:sldMkLst>
+        <pc:spChg chg="mod">
+          <ac:chgData name="Cesar Augusto Lopez Gallego" userId="0dfa9112-9251-4882-b472-cf2dfcee09d1" providerId="ADAL" clId="{EF67AD0F-41E1-4758-B38C-C728DCC8A591}" dt="2024-09-10T14:18:03.224" v="230" actId="207"/>
+          <ac:spMkLst>
+            <pc:docMk/>
+            <pc:sldMk cId="168026166" sldId="349"/>
+            <ac:spMk id="3" creationId="{C467F478-AE06-4352-93CE-44434E396BC2}"/>
+          </ac:spMkLst>
+        </pc:spChg>
+      </pc:sldChg>
       <pc:sldChg chg="new del">
         <pc:chgData name="Cesar Augusto Lopez Gallego" userId="0dfa9112-9251-4882-b472-cf2dfcee09d1" providerId="ADAL" clId="{EF67AD0F-41E1-4758-B38C-C728DCC8A591}" dt="2024-08-30T12:08:29.602" v="5" actId="47"/>
         <pc:sldMkLst>
@@ -291,7 +306,7 @@
           <a:p>
             <a:fld id="{BDCF4082-7146-476A-B590-4447682ABE83}" type="datetimeFigureOut">
               <a:rPr lang="es-CO" smtClean="0"/>
-              <a:t>30/08/2024</a:t>
+              <a:t>10/09/2024</a:t>
             </a:fld>
             <a:endParaRPr lang="es-CO"/>
           </a:p>
@@ -794,7 +809,7 @@
           <a:p>
             <a:fld id="{6B86245D-015E-46AE-96CC-32E8A5E9A1DF}" type="datetimeFigureOut">
               <a:rPr lang="es-CO" smtClean="0"/>
-              <a:t>30/08/2024</a:t>
+              <a:t>10/09/2024</a:t>
             </a:fld>
             <a:endParaRPr lang="es-CO"/>
           </a:p>
@@ -964,7 +979,7 @@
           <a:p>
             <a:fld id="{6B86245D-015E-46AE-96CC-32E8A5E9A1DF}" type="datetimeFigureOut">
               <a:rPr lang="es-CO" smtClean="0"/>
-              <a:t>30/08/2024</a:t>
+              <a:t>10/09/2024</a:t>
             </a:fld>
             <a:endParaRPr lang="es-CO"/>
           </a:p>
@@ -1144,7 +1159,7 @@
           <a:p>
             <a:fld id="{6B86245D-015E-46AE-96CC-32E8A5E9A1DF}" type="datetimeFigureOut">
               <a:rPr lang="es-CO" smtClean="0"/>
-              <a:t>30/08/2024</a:t>
+              <a:t>10/09/2024</a:t>
             </a:fld>
             <a:endParaRPr lang="es-CO"/>
           </a:p>
@@ -1343,7 +1358,7 @@
                 </a:solidFill>
               </a:rPr>
               <a:pPr/>
-              <a:t>30/08/2024</a:t>
+              <a:t>10/09/2024</a:t>
             </a:fld>
             <a:endParaRPr lang="es-CO">
               <a:solidFill>
@@ -1545,7 +1560,7 @@
                 </a:solidFill>
               </a:rPr>
               <a:pPr/>
-              <a:t>30/08/2024</a:t>
+              <a:t>10/09/2024</a:t>
             </a:fld>
             <a:endParaRPr lang="es-CO">
               <a:solidFill>
@@ -1823,7 +1838,7 @@
                 </a:solidFill>
               </a:rPr>
               <a:pPr/>
-              <a:t>30/08/2024</a:t>
+              <a:t>10/09/2024</a:t>
             </a:fld>
             <a:endParaRPr lang="es-CO">
               <a:solidFill>
@@ -2087,7 +2102,7 @@
                 </a:solidFill>
               </a:rPr>
               <a:pPr/>
-              <a:t>30/08/2024</a:t>
+              <a:t>10/09/2024</a:t>
             </a:fld>
             <a:endParaRPr lang="es-CO">
               <a:solidFill>
@@ -2486,7 +2501,7 @@
                 </a:solidFill>
               </a:rPr>
               <a:pPr/>
-              <a:t>30/08/2024</a:t>
+              <a:t>10/09/2024</a:t>
             </a:fld>
             <a:endParaRPr lang="es-CO">
               <a:solidFill>
@@ -2636,7 +2651,7 @@
                 </a:solidFill>
               </a:rPr>
               <a:pPr/>
-              <a:t>30/08/2024</a:t>
+              <a:t>10/09/2024</a:t>
             </a:fld>
             <a:endParaRPr lang="es-CO">
               <a:solidFill>
@@ -2763,7 +2778,7 @@
                 </a:solidFill>
               </a:rPr>
               <a:pPr/>
-              <a:t>30/08/2024</a:t>
+              <a:t>10/09/2024</a:t>
             </a:fld>
             <a:endParaRPr lang="es-CO">
               <a:solidFill>
@@ -3072,7 +3087,7 @@
                 </a:solidFill>
               </a:rPr>
               <a:pPr/>
-              <a:t>30/08/2024</a:t>
+              <a:t>10/09/2024</a:t>
             </a:fld>
             <a:endParaRPr lang="es-CO">
               <a:solidFill>
@@ -3267,7 +3282,7 @@
           <a:p>
             <a:fld id="{6B86245D-015E-46AE-96CC-32E8A5E9A1DF}" type="datetimeFigureOut">
               <a:rPr lang="es-CO" smtClean="0"/>
-              <a:t>30/08/2024</a:t>
+              <a:t>10/09/2024</a:t>
             </a:fld>
             <a:endParaRPr lang="es-CO"/>
           </a:p>
@@ -3531,7 +3546,7 @@
                 </a:solidFill>
               </a:rPr>
               <a:pPr/>
-              <a:t>30/08/2024</a:t>
+              <a:t>10/09/2024</a:t>
             </a:fld>
             <a:endParaRPr lang="es-CO">
               <a:solidFill>
@@ -3733,7 +3748,7 @@
                 </a:solidFill>
               </a:rPr>
               <a:pPr/>
-              <a:t>30/08/2024</a:t>
+              <a:t>10/09/2024</a:t>
             </a:fld>
             <a:endParaRPr lang="es-CO">
               <a:solidFill>
@@ -3945,7 +3960,7 @@
                 </a:solidFill>
               </a:rPr>
               <a:pPr/>
-              <a:t>30/08/2024</a:t>
+              <a:t>10/09/2024</a:t>
             </a:fld>
             <a:endParaRPr lang="es-CO">
               <a:solidFill>
@@ -4216,7 +4231,7 @@
           <a:p>
             <a:fld id="{6B86245D-015E-46AE-96CC-32E8A5E9A1DF}" type="datetimeFigureOut">
               <a:rPr lang="es-CO" smtClean="0"/>
-              <a:t>30/08/2024</a:t>
+              <a:t>10/09/2024</a:t>
             </a:fld>
             <a:endParaRPr lang="es-CO"/>
           </a:p>
@@ -4448,7 +4463,7 @@
           <a:p>
             <a:fld id="{6B86245D-015E-46AE-96CC-32E8A5E9A1DF}" type="datetimeFigureOut">
               <a:rPr lang="es-CO" smtClean="0"/>
-              <a:t>30/08/2024</a:t>
+              <a:t>10/09/2024</a:t>
             </a:fld>
             <a:endParaRPr lang="es-CO"/>
           </a:p>
@@ -4815,7 +4830,7 @@
           <a:p>
             <a:fld id="{6B86245D-015E-46AE-96CC-32E8A5E9A1DF}" type="datetimeFigureOut">
               <a:rPr lang="es-CO" smtClean="0"/>
-              <a:t>30/08/2024</a:t>
+              <a:t>10/09/2024</a:t>
             </a:fld>
             <a:endParaRPr lang="es-CO"/>
           </a:p>
@@ -4933,7 +4948,7 @@
           <a:p>
             <a:fld id="{6B86245D-015E-46AE-96CC-32E8A5E9A1DF}" type="datetimeFigureOut">
               <a:rPr lang="es-CO" smtClean="0"/>
-              <a:t>30/08/2024</a:t>
+              <a:t>10/09/2024</a:t>
             </a:fld>
             <a:endParaRPr lang="es-CO"/>
           </a:p>
@@ -5028,7 +5043,7 @@
           <a:p>
             <a:fld id="{6B86245D-015E-46AE-96CC-32E8A5E9A1DF}" type="datetimeFigureOut">
               <a:rPr lang="es-CO" smtClean="0"/>
-              <a:t>30/08/2024</a:t>
+              <a:t>10/09/2024</a:t>
             </a:fld>
             <a:endParaRPr lang="es-CO"/>
           </a:p>
@@ -5305,7 +5320,7 @@
           <a:p>
             <a:fld id="{6B86245D-015E-46AE-96CC-32E8A5E9A1DF}" type="datetimeFigureOut">
               <a:rPr lang="es-CO" smtClean="0"/>
-              <a:t>30/08/2024</a:t>
+              <a:t>10/09/2024</a:t>
             </a:fld>
             <a:endParaRPr lang="es-CO"/>
           </a:p>
@@ -5562,7 +5577,7 @@
           <a:p>
             <a:fld id="{6B86245D-015E-46AE-96CC-32E8A5E9A1DF}" type="datetimeFigureOut">
               <a:rPr lang="es-CO" smtClean="0"/>
-              <a:t>30/08/2024</a:t>
+              <a:t>10/09/2024</a:t>
             </a:fld>
             <a:endParaRPr lang="es-CO"/>
           </a:p>
@@ -5784,7 +5799,7 @@
           <a:p>
             <a:fld id="{6B86245D-015E-46AE-96CC-32E8A5E9A1DF}" type="datetimeFigureOut">
               <a:rPr lang="es-CO" smtClean="0"/>
-              <a:t>30/08/2024</a:t>
+              <a:t>10/09/2024</a:t>
             </a:fld>
             <a:endParaRPr lang="es-CO"/>
           </a:p>
@@ -6340,7 +6355,7 @@
                 </a:solidFill>
               </a:rPr>
               <a:pPr/>
-              <a:t>30/08/2024</a:t>
+              <a:t>10/09/2024</a:t>
             </a:fld>
             <a:endParaRPr lang="es-CO">
               <a:solidFill>
@@ -10654,354 +10669,473 @@
         </p:spPr>
         <p:txBody>
           <a:bodyPr>
-            <a:normAutofit fontScale="85000" lnSpcReduction="10000"/>
+            <a:normAutofit/>
           </a:bodyPr>
           <a:lstStyle/>
           <a:p>
             <a:r>
-              <a:rPr lang="en-US" dirty="0" err="1"/>
+              <a:rPr lang="en-US" b="1" dirty="0" err="1">
+                <a:solidFill>
+                  <a:schemeClr val="accent6"/>
+                </a:solidFill>
+              </a:rPr>
               <a:t>Construya</a:t>
             </a:r>
             <a:r>
-              <a:rPr lang="en-US" dirty="0"/>
+              <a:rPr lang="en-US" b="1" dirty="0">
+                <a:solidFill>
+                  <a:schemeClr val="accent6"/>
+                </a:solidFill>
+              </a:rPr>
               <a:t> un </a:t>
             </a:r>
             <a:r>
-              <a:rPr lang="en-US" dirty="0" err="1"/>
+              <a:rPr lang="en-US" b="1" dirty="0" err="1">
+                <a:solidFill>
+                  <a:schemeClr val="accent6"/>
+                </a:solidFill>
+              </a:rPr>
               <a:t>algoritmo</a:t>
             </a:r>
             <a:r>
-              <a:rPr lang="en-US" dirty="0"/>
+              <a:rPr lang="en-US" b="1" dirty="0">
+                <a:solidFill>
+                  <a:schemeClr val="accent6"/>
+                </a:solidFill>
+              </a:rPr>
               <a:t> que lea un </a:t>
             </a:r>
             <a:r>
-              <a:rPr lang="en-US" dirty="0" err="1"/>
+              <a:rPr lang="en-US" b="1" dirty="0" err="1">
+                <a:solidFill>
+                  <a:schemeClr val="accent6"/>
+                </a:solidFill>
+              </a:rPr>
               <a:t>archivo</a:t>
             </a:r>
             <a:r>
-              <a:rPr lang="en-US" dirty="0"/>
+              <a:rPr lang="en-US" b="1" dirty="0">
+                <a:solidFill>
+                  <a:schemeClr val="accent6"/>
+                </a:solidFill>
+              </a:rPr>
+              <a:t> e </a:t>
+            </a:r>
+            <a:r>
+              <a:rPr lang="en-US" b="1" dirty="0" err="1">
+                <a:solidFill>
+                  <a:schemeClr val="accent6"/>
+                </a:solidFill>
+              </a:rPr>
+              <a:t>imprima</a:t>
+            </a:r>
+            <a:r>
+              <a:rPr lang="en-US" b="1" dirty="0">
+                <a:solidFill>
+                  <a:schemeClr val="accent6"/>
+                </a:solidFill>
+              </a:rPr>
+              <a:t> la </a:t>
+            </a:r>
+            <a:r>
+              <a:rPr lang="en-US" b="1" dirty="0" err="1">
+                <a:solidFill>
+                  <a:schemeClr val="accent6"/>
+                </a:solidFill>
+              </a:rPr>
+              <a:t>cantidad</a:t>
+            </a:r>
+            <a:r>
+              <a:rPr lang="en-US" b="1" dirty="0">
+                <a:solidFill>
+                  <a:schemeClr val="accent6"/>
+                </a:solidFill>
+              </a:rPr>
               <a:t> de </a:t>
             </a:r>
             <a:r>
-              <a:rPr lang="en-US" dirty="0" err="1"/>
-              <a:t>mediciones</a:t>
-            </a:r>
-            <a:r>
-              <a:rPr lang="en-US" dirty="0"/>
-              <a:t> y las </a:t>
-            </a:r>
-            <a:r>
-              <a:rPr lang="en-US" dirty="0" err="1"/>
-              <a:t>imprima</a:t>
-            </a:r>
-            <a:r>
-              <a:rPr lang="en-US" dirty="0"/>
-              <a:t> de la </a:t>
-            </a:r>
-            <a:r>
-              <a:rPr lang="en-US" dirty="0" err="1"/>
-              <a:t>siguiente</a:t>
-            </a:r>
-            <a:r>
-              <a:rPr lang="en-US" dirty="0"/>
-              <a:t> forma: </a:t>
-            </a:r>
-            <a:r>
-              <a:rPr lang="en-US" dirty="0" err="1"/>
-              <a:t>medición</a:t>
-            </a:r>
-            <a:r>
-              <a:rPr lang="en-US" dirty="0"/>
-              <a:t> 1: ##.</a:t>
-            </a:r>
-          </a:p>
-          <a:p>
-            <a:r>
-              <a:rPr lang="en-US" dirty="0"/>
-              <a:t>Al </a:t>
-            </a:r>
-            <a:r>
-              <a:rPr lang="en-US" dirty="0" err="1"/>
-              <a:t>algoritmo</a:t>
-            </a:r>
-            <a:r>
-              <a:rPr lang="en-US" dirty="0"/>
-              <a:t> anterior </a:t>
-            </a:r>
-            <a:r>
-              <a:rPr lang="en-US" dirty="0" err="1"/>
-              <a:t>sacar</a:t>
-            </a:r>
-            <a:r>
-              <a:rPr lang="en-US" dirty="0"/>
-              <a:t> el </a:t>
-            </a:r>
-            <a:r>
-              <a:rPr lang="en-US" dirty="0" err="1"/>
-              <a:t>promedio</a:t>
-            </a:r>
-            <a:r>
-              <a:rPr lang="en-US" dirty="0"/>
-              <a:t> de las </a:t>
-            </a:r>
-            <a:r>
-              <a:rPr lang="en-US" dirty="0" err="1"/>
-              <a:t>mediciones</a:t>
-            </a:r>
-            <a:endParaRPr lang="en-US" dirty="0"/>
-          </a:p>
-          <a:p>
-            <a:r>
-              <a:rPr lang="en-US" dirty="0" err="1"/>
-              <a:t>Construya</a:t>
-            </a:r>
-            <a:r>
-              <a:rPr lang="en-US" dirty="0"/>
+              <a:rPr lang="en-US" b="1" dirty="0" err="1">
+                <a:solidFill>
+                  <a:schemeClr val="accent6"/>
+                </a:solidFill>
+              </a:rPr>
+              <a:t>estudiantes</a:t>
+            </a:r>
+            <a:r>
+              <a:rPr lang="en-US" b="1" dirty="0">
+                <a:solidFill>
+                  <a:schemeClr val="accent6"/>
+                </a:solidFill>
+              </a:rPr>
+              <a:t> que hay por </a:t>
+            </a:r>
+            <a:r>
+              <a:rPr lang="en-US" b="1" dirty="0" err="1">
+                <a:solidFill>
+                  <a:schemeClr val="accent6"/>
+                </a:solidFill>
+              </a:rPr>
+              <a:t>curso</a:t>
+            </a:r>
+            <a:r>
+              <a:rPr lang="en-US" b="1" dirty="0">
+                <a:solidFill>
+                  <a:schemeClr val="accent6"/>
+                </a:solidFill>
+              </a:rPr>
+              <a:t>. </a:t>
+            </a:r>
+          </a:p>
+          <a:p>
+            <a:pPr marL="0" indent="0">
+              <a:buNone/>
+            </a:pPr>
+            <a:r>
+              <a:rPr lang="en-US" b="1" dirty="0">
+                <a:solidFill>
+                  <a:schemeClr val="accent6"/>
+                </a:solidFill>
+              </a:rPr>
+              <a:t>La </a:t>
+            </a:r>
+            <a:r>
+              <a:rPr lang="en-US" b="1" dirty="0" err="1">
+                <a:solidFill>
+                  <a:schemeClr val="accent6"/>
+                </a:solidFill>
+              </a:rPr>
+              <a:t>salida</a:t>
+            </a:r>
+            <a:r>
+              <a:rPr lang="en-US" b="1" dirty="0">
+                <a:solidFill>
+                  <a:schemeClr val="accent6"/>
+                </a:solidFill>
+              </a:rPr>
+              <a:t> </a:t>
+            </a:r>
+            <a:r>
+              <a:rPr lang="en-US" b="1" dirty="0" err="1">
+                <a:solidFill>
+                  <a:schemeClr val="accent6"/>
+                </a:solidFill>
+              </a:rPr>
+              <a:t>en</a:t>
+            </a:r>
+            <a:r>
+              <a:rPr lang="en-US" b="1" dirty="0">
+                <a:solidFill>
+                  <a:schemeClr val="accent6"/>
+                </a:solidFill>
+              </a:rPr>
               <a:t> un </a:t>
             </a:r>
             <a:r>
-              <a:rPr lang="en-US" dirty="0" err="1"/>
-              <a:t>algoritmo</a:t>
-            </a:r>
-            <a:r>
-              <a:rPr lang="en-US" dirty="0"/>
-              <a:t> que lea un </a:t>
-            </a:r>
-            <a:r>
-              <a:rPr lang="en-US" dirty="0" err="1"/>
+              <a:rPr lang="en-US" b="1" dirty="0" err="1">
+                <a:solidFill>
+                  <a:schemeClr val="accent6"/>
+                </a:solidFill>
+              </a:rPr>
               <a:t>archivo</a:t>
             </a:r>
             <a:r>
-              <a:rPr lang="en-US" dirty="0"/>
-              <a:t> de palabras y </a:t>
-            </a:r>
-            <a:r>
-              <a:rPr lang="en-US" dirty="0" err="1"/>
-              <a:t>cuente</a:t>
-            </a:r>
-            <a:r>
-              <a:rPr lang="en-US" dirty="0"/>
-              <a:t> las </a:t>
-            </a:r>
-            <a:r>
-              <a:rPr lang="en-US" dirty="0" err="1"/>
-              <a:t>veces</a:t>
-            </a:r>
-            <a:r>
-              <a:rPr lang="en-US" dirty="0"/>
-              <a:t> que sale la palabra “GANAR”</a:t>
-            </a:r>
-          </a:p>
-          <a:p>
-            <a:r>
-              <a:rPr lang="en-US" dirty="0" err="1"/>
-              <a:t>Construya</a:t>
-            </a:r>
-            <a:r>
-              <a:rPr lang="en-US" dirty="0"/>
-              <a:t> un </a:t>
-            </a:r>
-            <a:r>
-              <a:rPr lang="en-US" dirty="0" err="1"/>
-              <a:t>algoritmo</a:t>
-            </a:r>
-            <a:r>
-              <a:rPr lang="en-US" dirty="0"/>
-              <a:t> que lea un </a:t>
-            </a:r>
-            <a:r>
-              <a:rPr lang="en-US" dirty="0" err="1"/>
-              <a:t>archivo</a:t>
-            </a:r>
-            <a:r>
-              <a:rPr lang="en-US" dirty="0"/>
-              <a:t> e </a:t>
-            </a:r>
-            <a:r>
-              <a:rPr lang="en-US" dirty="0" err="1"/>
-              <a:t>imprima</a:t>
-            </a:r>
-            <a:r>
-              <a:rPr lang="en-US" dirty="0"/>
+              <a:rPr lang="en-US" b="1" dirty="0">
+                <a:solidFill>
+                  <a:schemeClr val="accent6"/>
+                </a:solidFill>
+              </a:rPr>
+              <a:t>: </a:t>
+            </a:r>
+            <a:r>
+              <a:rPr lang="en-US" b="1" dirty="0" err="1">
+                <a:solidFill>
+                  <a:schemeClr val="accent6"/>
+                </a:solidFill>
+              </a:rPr>
+              <a:t>nombre</a:t>
+            </a:r>
+            <a:r>
+              <a:rPr lang="en-US" b="1" dirty="0">
+                <a:solidFill>
+                  <a:schemeClr val="accent6"/>
+                </a:solidFill>
+              </a:rPr>
+              <a:t> del </a:t>
+            </a:r>
+            <a:r>
+              <a:rPr lang="en-US" b="1" dirty="0" err="1">
+                <a:solidFill>
+                  <a:schemeClr val="accent6"/>
+                </a:solidFill>
+              </a:rPr>
+              <a:t>curso</a:t>
+            </a:r>
+            <a:r>
+              <a:rPr lang="en-US" b="1" dirty="0">
+                <a:solidFill>
+                  <a:schemeClr val="accent6"/>
+                </a:solidFill>
+              </a:rPr>
+              <a:t>, </a:t>
+            </a:r>
+            <a:r>
+              <a:rPr lang="en-US" b="1" dirty="0" err="1">
+                <a:solidFill>
+                  <a:schemeClr val="accent6"/>
+                </a:solidFill>
+              </a:rPr>
+              <a:t>cuántos</a:t>
+            </a:r>
+            <a:r>
+              <a:rPr lang="en-US" b="1" dirty="0">
+                <a:solidFill>
+                  <a:schemeClr val="accent6"/>
+                </a:solidFill>
+              </a:rPr>
+              <a:t> lo </a:t>
+            </a:r>
+            <a:r>
+              <a:rPr lang="en-US" b="1" dirty="0" err="1">
+                <a:solidFill>
+                  <a:schemeClr val="accent6"/>
+                </a:solidFill>
+              </a:rPr>
+              <a:t>aprobaron</a:t>
+            </a:r>
+            <a:r>
+              <a:rPr lang="en-US" b="1" dirty="0">
+                <a:solidFill>
+                  <a:schemeClr val="accent6"/>
+                </a:solidFill>
+              </a:rPr>
+              <a:t>, </a:t>
+            </a:r>
+            <a:r>
+              <a:rPr lang="en-US" b="1" dirty="0" err="1">
+                <a:solidFill>
+                  <a:schemeClr val="accent6"/>
+                </a:solidFill>
+              </a:rPr>
+              <a:t>cuántos</a:t>
+            </a:r>
+            <a:r>
+              <a:rPr lang="en-US" b="1" dirty="0">
+                <a:solidFill>
+                  <a:schemeClr val="accent6"/>
+                </a:solidFill>
+              </a:rPr>
+              <a:t> lo </a:t>
+            </a:r>
+            <a:r>
+              <a:rPr lang="en-US" b="1" dirty="0" err="1">
+                <a:solidFill>
+                  <a:schemeClr val="accent6"/>
+                </a:solidFill>
+              </a:rPr>
+              <a:t>perdieron</a:t>
+            </a:r>
+            <a:r>
+              <a:rPr lang="en-US" b="1" dirty="0">
+                <a:solidFill>
+                  <a:schemeClr val="accent6"/>
+                </a:solidFill>
+              </a:rPr>
+              <a:t> y </a:t>
+            </a:r>
+            <a:r>
+              <a:rPr lang="en-US" b="1" dirty="0" err="1">
+                <a:solidFill>
+                  <a:schemeClr val="accent6"/>
+                </a:solidFill>
+              </a:rPr>
+              <a:t>el</a:t>
+            </a:r>
+            <a:r>
+              <a:rPr lang="en-US" b="1" dirty="0">
+                <a:solidFill>
+                  <a:schemeClr val="accent6"/>
+                </a:solidFill>
+              </a:rPr>
+              <a:t> total de </a:t>
+            </a:r>
+            <a:r>
+              <a:rPr lang="en-US" b="1" dirty="0" err="1">
+                <a:solidFill>
+                  <a:schemeClr val="accent6"/>
+                </a:solidFill>
+              </a:rPr>
+              <a:t>estudiantes</a:t>
+            </a:r>
+            <a:r>
+              <a:rPr lang="en-US" b="1" dirty="0">
+                <a:solidFill>
+                  <a:schemeClr val="accent6"/>
+                </a:solidFill>
+              </a:rPr>
+              <a:t> del </a:t>
+            </a:r>
+            <a:r>
+              <a:rPr lang="en-US" b="1" dirty="0" err="1">
+                <a:solidFill>
+                  <a:schemeClr val="accent6"/>
+                </a:solidFill>
+              </a:rPr>
+              <a:t>curso</a:t>
+            </a:r>
+            <a:r>
+              <a:rPr lang="en-US" b="1" dirty="0">
+                <a:solidFill>
+                  <a:schemeClr val="accent6"/>
+                </a:solidFill>
+              </a:rPr>
+              <a:t>.. </a:t>
+            </a:r>
+          </a:p>
+          <a:p>
+            <a:pPr marL="0" indent="0">
+              <a:buNone/>
+            </a:pPr>
+            <a:r>
+              <a:rPr lang="en-US" b="1" dirty="0" err="1">
+                <a:solidFill>
+                  <a:schemeClr val="accent6"/>
+                </a:solidFill>
+              </a:rPr>
+              <a:t>En</a:t>
+            </a:r>
+            <a:r>
+              <a:rPr lang="en-US" b="1" dirty="0">
+                <a:solidFill>
+                  <a:schemeClr val="accent6"/>
+                </a:solidFill>
+              </a:rPr>
               <a:t> la </a:t>
             </a:r>
             <a:r>
-              <a:rPr lang="en-US" dirty="0" err="1"/>
+              <a:rPr lang="en-US" b="1" dirty="0" err="1">
+                <a:solidFill>
+                  <a:schemeClr val="accent6"/>
+                </a:solidFill>
+              </a:rPr>
+              <a:t>estructura</a:t>
+            </a:r>
+            <a:r>
+              <a:rPr lang="en-US" b="1" dirty="0">
+                <a:solidFill>
+                  <a:schemeClr val="accent6"/>
+                </a:solidFill>
+              </a:rPr>
+              <a:t> de los </a:t>
+            </a:r>
+            <a:r>
+              <a:rPr lang="en-US" b="1" dirty="0" err="1">
+                <a:solidFill>
+                  <a:schemeClr val="accent6"/>
+                </a:solidFill>
+              </a:rPr>
+              <a:t>datos</a:t>
+            </a:r>
+            <a:r>
+              <a:rPr lang="en-US" b="1" dirty="0">
+                <a:solidFill>
+                  <a:schemeClr val="accent6"/>
+                </a:solidFill>
+              </a:rPr>
+              <a:t> (</a:t>
+            </a:r>
+            <a:r>
+              <a:rPr lang="en-US" b="1" dirty="0" err="1">
+                <a:solidFill>
+                  <a:schemeClr val="accent6"/>
+                </a:solidFill>
+              </a:rPr>
+              <a:t>ver</a:t>
+            </a:r>
+            <a:r>
+              <a:rPr lang="en-US" b="1" dirty="0">
+                <a:solidFill>
+                  <a:schemeClr val="accent6"/>
+                </a:solidFill>
+              </a:rPr>
+              <a:t> a la </a:t>
+            </a:r>
+            <a:r>
+              <a:rPr lang="en-US" b="1" dirty="0" err="1">
+                <a:solidFill>
+                  <a:schemeClr val="accent6"/>
+                </a:solidFill>
+              </a:rPr>
+              <a:t>derecha</a:t>
+            </a:r>
+            <a:r>
+              <a:rPr lang="en-US" b="1" dirty="0">
+                <a:solidFill>
+                  <a:schemeClr val="accent6"/>
+                </a:solidFill>
+              </a:rPr>
+              <a:t>) primero </a:t>
+            </a:r>
+            <a:r>
+              <a:rPr lang="en-US" b="1" dirty="0" err="1">
+                <a:solidFill>
+                  <a:schemeClr val="accent6"/>
+                </a:solidFill>
+              </a:rPr>
+              <a:t>aparecen</a:t>
+            </a:r>
+            <a:r>
+              <a:rPr lang="en-US" b="1" dirty="0">
+                <a:solidFill>
+                  <a:schemeClr val="accent6"/>
+                </a:solidFill>
+              </a:rPr>
+              <a:t> la </a:t>
+            </a:r>
+            <a:r>
+              <a:rPr lang="en-US" b="1" dirty="0" err="1">
+                <a:solidFill>
+                  <a:schemeClr val="accent6"/>
+                </a:solidFill>
+              </a:rPr>
               <a:t>cantidad</a:t>
             </a:r>
             <a:r>
-              <a:rPr lang="en-US" dirty="0"/>
-              <a:t> de </a:t>
-            </a:r>
-            <a:r>
-              <a:rPr lang="en-US" dirty="0" err="1"/>
-              <a:t>estudiantes</a:t>
-            </a:r>
-            <a:r>
-              <a:rPr lang="en-US" dirty="0"/>
-              <a:t> que hay </a:t>
-            </a:r>
-            <a:r>
-              <a:rPr lang="en-US" dirty="0" err="1"/>
-              <a:t>por</a:t>
-            </a:r>
-            <a:r>
-              <a:rPr lang="en-US" dirty="0"/>
-              <a:t> </a:t>
-            </a:r>
-            <a:r>
-              <a:rPr lang="en-US" dirty="0" err="1"/>
-              <a:t>curso</a:t>
-            </a:r>
-            <a:r>
-              <a:rPr lang="en-US" dirty="0"/>
-              <a:t>:</a:t>
-            </a:r>
-          </a:p>
-          <a:p>
-            <a:pPr marL="0" indent="0">
-              <a:buNone/>
-            </a:pPr>
-            <a:r>
-              <a:rPr lang="en-US" dirty="0"/>
-              <a:t>La </a:t>
-            </a:r>
-            <a:r>
-              <a:rPr lang="en-US" dirty="0" err="1"/>
-              <a:t>salida</a:t>
-            </a:r>
-            <a:r>
-              <a:rPr lang="en-US" dirty="0"/>
-              <a:t> </a:t>
-            </a:r>
-            <a:r>
-              <a:rPr lang="en-US" dirty="0" err="1"/>
-              <a:t>es</a:t>
-            </a:r>
-            <a:r>
-              <a:rPr lang="en-US" dirty="0"/>
-              <a:t>: </a:t>
-            </a:r>
-            <a:r>
-              <a:rPr lang="en-US" dirty="0" err="1"/>
-              <a:t>número</a:t>
-            </a:r>
-            <a:r>
-              <a:rPr lang="en-US" dirty="0"/>
-              <a:t> de </a:t>
-            </a:r>
-            <a:r>
-              <a:rPr lang="en-US" dirty="0" err="1"/>
-              <a:t>curso</a:t>
-            </a:r>
-            <a:r>
-              <a:rPr lang="en-US" dirty="0"/>
-              <a:t>, </a:t>
-            </a:r>
-            <a:r>
-              <a:rPr lang="en-US" dirty="0" err="1"/>
-              <a:t>cuántos</a:t>
-            </a:r>
-            <a:r>
-              <a:rPr lang="en-US" dirty="0"/>
-              <a:t> lo </a:t>
-            </a:r>
-            <a:r>
-              <a:rPr lang="en-US" dirty="0" err="1"/>
+              <a:rPr lang="en-US" b="1" dirty="0">
+                <a:solidFill>
+                  <a:schemeClr val="accent6"/>
+                </a:solidFill>
+              </a:rPr>
+              <a:t> y </a:t>
+            </a:r>
+            <a:r>
+              <a:rPr lang="en-US" b="1" dirty="0" err="1">
+                <a:solidFill>
+                  <a:schemeClr val="accent6"/>
+                </a:solidFill>
+              </a:rPr>
+              <a:t>luego</a:t>
+            </a:r>
+            <a:r>
+              <a:rPr lang="en-US" b="1" dirty="0">
+                <a:solidFill>
+                  <a:schemeClr val="accent6"/>
+                </a:solidFill>
+              </a:rPr>
+              <a:t> los que </a:t>
+            </a:r>
+            <a:r>
+              <a:rPr lang="en-US" b="1" dirty="0" err="1">
+                <a:solidFill>
+                  <a:schemeClr val="accent6"/>
+                </a:solidFill>
+              </a:rPr>
               <a:t>aprobaron</a:t>
             </a:r>
-            <a:r>
-              <a:rPr lang="en-US" dirty="0"/>
-              <a:t> y </a:t>
-            </a:r>
-            <a:r>
-              <a:rPr lang="en-US" dirty="0" err="1"/>
-              <a:t>cuántos</a:t>
-            </a:r>
-            <a:r>
-              <a:rPr lang="en-US" dirty="0"/>
-              <a:t> lo </a:t>
-            </a:r>
-            <a:r>
-              <a:rPr lang="en-US" dirty="0" err="1"/>
-              <a:t>perdieron</a:t>
-            </a:r>
-            <a:r>
-              <a:rPr lang="en-US" dirty="0"/>
-              <a:t>.. </a:t>
-            </a:r>
-            <a:r>
-              <a:rPr lang="en-US" dirty="0" err="1"/>
-              <a:t>En</a:t>
-            </a:r>
-            <a:r>
-              <a:rPr lang="en-US" dirty="0"/>
-              <a:t> la </a:t>
-            </a:r>
-            <a:r>
-              <a:rPr lang="en-US" dirty="0" err="1"/>
-              <a:t>estructura</a:t>
-            </a:r>
-            <a:r>
-              <a:rPr lang="en-US" dirty="0"/>
-              <a:t> de </a:t>
-            </a:r>
-            <a:r>
-              <a:rPr lang="en-US" dirty="0" err="1"/>
-              <a:t>los</a:t>
-            </a:r>
-            <a:r>
-              <a:rPr lang="en-US" dirty="0"/>
-              <a:t> </a:t>
-            </a:r>
-            <a:r>
-              <a:rPr lang="en-US" dirty="0" err="1"/>
-              <a:t>datos</a:t>
-            </a:r>
-            <a:r>
-              <a:rPr lang="en-US" dirty="0"/>
-              <a:t> primero </a:t>
-            </a:r>
-            <a:r>
-              <a:rPr lang="en-US" dirty="0" err="1"/>
-              <a:t>aparecen</a:t>
-            </a:r>
-            <a:r>
-              <a:rPr lang="en-US" dirty="0"/>
-              <a:t> la </a:t>
-            </a:r>
-            <a:r>
-              <a:rPr lang="en-US" dirty="0" err="1"/>
-              <a:t>cantidad</a:t>
-            </a:r>
-            <a:r>
-              <a:rPr lang="en-US" dirty="0"/>
-              <a:t> y </a:t>
-            </a:r>
-            <a:r>
-              <a:rPr lang="en-US" dirty="0" err="1"/>
-              <a:t>luego</a:t>
-            </a:r>
-            <a:r>
-              <a:rPr lang="en-US" dirty="0"/>
-              <a:t> </a:t>
-            </a:r>
-            <a:r>
-              <a:rPr lang="en-US" dirty="0" err="1"/>
-              <a:t>los</a:t>
-            </a:r>
-            <a:r>
-              <a:rPr lang="en-US" dirty="0"/>
-              <a:t> que </a:t>
-            </a:r>
-            <a:r>
-              <a:rPr lang="en-US" dirty="0" err="1"/>
-              <a:t>aprobaron</a:t>
-            </a:r>
-            <a:r>
-              <a:rPr lang="en-US" dirty="0"/>
-              <a:t>:</a:t>
-            </a:r>
+            <a:endParaRPr lang="en-US" b="1" dirty="0">
+              <a:solidFill>
+                <a:schemeClr val="accent6"/>
+              </a:solidFill>
+            </a:endParaRPr>
           </a:p>
           <a:p>
             <a:pPr marL="0" indent="0">

</xml_diff>